<commit_message>
add: add image (#4)
</commit_message>
<xml_diff>
--- a/Images/images.pptx
+++ b/Images/images.pptx
@@ -201,7 +201,7 @@
           <a:p>
             <a:fld id="{345D69B4-D046-48EA-AF76-DEB8D4CA50A7}" type="datetimeFigureOut">
               <a:rPr lang="zh-CN" altLang="en-US" smtClean="0"/>
-              <a:t>2024/7/23</a:t>
+              <a:t>2024/7/24</a:t>
             </a:fld>
             <a:endParaRPr lang="zh-CN" altLang="en-US"/>
           </a:p>
@@ -699,7 +699,7 @@
           <a:p>
             <a:fld id="{560DCAC3-BD00-4D63-BFCE-98EE12B63920}" type="datetimeFigureOut">
               <a:rPr lang="zh-CN" altLang="en-US" smtClean="0"/>
-              <a:t>2024/7/23</a:t>
+              <a:t>2024/7/24</a:t>
             </a:fld>
             <a:endParaRPr lang="zh-CN" altLang="en-US"/>
           </a:p>
@@ -897,7 +897,7 @@
           <a:p>
             <a:fld id="{560DCAC3-BD00-4D63-BFCE-98EE12B63920}" type="datetimeFigureOut">
               <a:rPr lang="zh-CN" altLang="en-US" smtClean="0"/>
-              <a:t>2024/7/23</a:t>
+              <a:t>2024/7/24</a:t>
             </a:fld>
             <a:endParaRPr lang="zh-CN" altLang="en-US"/>
           </a:p>
@@ -1105,7 +1105,7 @@
           <a:p>
             <a:fld id="{560DCAC3-BD00-4D63-BFCE-98EE12B63920}" type="datetimeFigureOut">
               <a:rPr lang="zh-CN" altLang="en-US" smtClean="0"/>
-              <a:t>2024/7/23</a:t>
+              <a:t>2024/7/24</a:t>
             </a:fld>
             <a:endParaRPr lang="zh-CN" altLang="en-US"/>
           </a:p>
@@ -1303,7 +1303,7 @@
           <a:p>
             <a:fld id="{560DCAC3-BD00-4D63-BFCE-98EE12B63920}" type="datetimeFigureOut">
               <a:rPr lang="zh-CN" altLang="en-US" smtClean="0"/>
-              <a:t>2024/7/23</a:t>
+              <a:t>2024/7/24</a:t>
             </a:fld>
             <a:endParaRPr lang="zh-CN" altLang="en-US"/>
           </a:p>
@@ -1578,7 +1578,7 @@
           <a:p>
             <a:fld id="{560DCAC3-BD00-4D63-BFCE-98EE12B63920}" type="datetimeFigureOut">
               <a:rPr lang="zh-CN" altLang="en-US" smtClean="0"/>
-              <a:t>2024/7/23</a:t>
+              <a:t>2024/7/24</a:t>
             </a:fld>
             <a:endParaRPr lang="zh-CN" altLang="en-US"/>
           </a:p>
@@ -1843,7 +1843,7 @@
           <a:p>
             <a:fld id="{560DCAC3-BD00-4D63-BFCE-98EE12B63920}" type="datetimeFigureOut">
               <a:rPr lang="zh-CN" altLang="en-US" smtClean="0"/>
-              <a:t>2024/7/23</a:t>
+              <a:t>2024/7/24</a:t>
             </a:fld>
             <a:endParaRPr lang="zh-CN" altLang="en-US"/>
           </a:p>
@@ -2255,7 +2255,7 @@
           <a:p>
             <a:fld id="{560DCAC3-BD00-4D63-BFCE-98EE12B63920}" type="datetimeFigureOut">
               <a:rPr lang="zh-CN" altLang="en-US" smtClean="0"/>
-              <a:t>2024/7/23</a:t>
+              <a:t>2024/7/24</a:t>
             </a:fld>
             <a:endParaRPr lang="zh-CN" altLang="en-US"/>
           </a:p>
@@ -2396,7 +2396,7 @@
           <a:p>
             <a:fld id="{560DCAC3-BD00-4D63-BFCE-98EE12B63920}" type="datetimeFigureOut">
               <a:rPr lang="zh-CN" altLang="en-US" smtClean="0"/>
-              <a:t>2024/7/23</a:t>
+              <a:t>2024/7/24</a:t>
             </a:fld>
             <a:endParaRPr lang="zh-CN" altLang="en-US"/>
           </a:p>
@@ -2509,7 +2509,7 @@
           <a:p>
             <a:fld id="{560DCAC3-BD00-4D63-BFCE-98EE12B63920}" type="datetimeFigureOut">
               <a:rPr lang="zh-CN" altLang="en-US" smtClean="0"/>
-              <a:t>2024/7/23</a:t>
+              <a:t>2024/7/24</a:t>
             </a:fld>
             <a:endParaRPr lang="zh-CN" altLang="en-US"/>
           </a:p>
@@ -2820,7 +2820,7 @@
           <a:p>
             <a:fld id="{560DCAC3-BD00-4D63-BFCE-98EE12B63920}" type="datetimeFigureOut">
               <a:rPr lang="zh-CN" altLang="en-US" smtClean="0"/>
-              <a:t>2024/7/23</a:t>
+              <a:t>2024/7/24</a:t>
             </a:fld>
             <a:endParaRPr lang="zh-CN" altLang="en-US"/>
           </a:p>
@@ -3108,7 +3108,7 @@
           <a:p>
             <a:fld id="{560DCAC3-BD00-4D63-BFCE-98EE12B63920}" type="datetimeFigureOut">
               <a:rPr lang="zh-CN" altLang="en-US" smtClean="0"/>
-              <a:t>2024/7/23</a:t>
+              <a:t>2024/7/24</a:t>
             </a:fld>
             <a:endParaRPr lang="zh-CN" altLang="en-US"/>
           </a:p>
@@ -3349,7 +3349,7 @@
           <a:p>
             <a:fld id="{560DCAC3-BD00-4D63-BFCE-98EE12B63920}" type="datetimeFigureOut">
               <a:rPr lang="zh-CN" altLang="en-US" smtClean="0"/>
-              <a:t>2024/7/23</a:t>
+              <a:t>2024/7/24</a:t>
             </a:fld>
             <a:endParaRPr lang="zh-CN" altLang="en-US"/>
           </a:p>
@@ -23271,13 +23271,6 @@
               </a:solidFill>
               <a:prstDash val="sysDash"/>
             </a:ln>
-            <a:scene3d>
-              <a:camera prst="orthographicFront"/>
-              <a:lightRig rig="threePt" dir="t"/>
-            </a:scene3d>
-            <a:sp3d>
-              <a:bevelT/>
-            </a:sp3d>
           </p:spPr>
           <p:style>
             <a:lnRef idx="2">
@@ -23582,8 +23575,8 @@
           </a:fontRef>
         </p:style>
       </p:cxnSp>
-      <mc:AlternateContent xmlns:mc="http://schemas.openxmlformats.org/markup-compatibility/2006">
-        <mc:Choice xmlns:a14="http://schemas.microsoft.com/office/drawing/2010/main" Requires="a14">
+      <mc:AlternateContent xmlns:mc="http://schemas.openxmlformats.org/markup-compatibility/2006" xmlns:a14="http://schemas.microsoft.com/office/drawing/2010/main">
+        <mc:Choice Requires="a14">
           <p:sp>
             <p:nvSpPr>
               <p:cNvPr id="316" name="文本框 315">
@@ -23653,7 +23646,7 @@
             </p:txBody>
           </p:sp>
         </mc:Choice>
-        <mc:Fallback>
+        <mc:Fallback xmlns="">
           <p:sp>
             <p:nvSpPr>
               <p:cNvPr id="316" name="文本框 315">
@@ -23913,6 +23906,70 @@
               <a:latin typeface="Times New Roman" panose="02020603050405020304" pitchFamily="18" charset="0"/>
               <a:cs typeface="Times New Roman" panose="02020603050405020304" pitchFamily="18" charset="0"/>
             </a:endParaRPr>
+          </a:p>
+        </p:txBody>
+      </p:sp>
+      <p:sp>
+        <p:nvSpPr>
+          <p:cNvPr id="69" name="矩形: 圆角 113">
+            <a:extLst>
+              <a:ext uri="{FF2B5EF4-FFF2-40B4-BE49-F238E27FC236}">
+                <a16:creationId xmlns:a16="http://schemas.microsoft.com/office/drawing/2014/main" id="{C19FCACC-DE70-6F27-5531-2EB6602C05DA}"/>
+              </a:ext>
+            </a:extLst>
+          </p:cNvPr>
+          <p:cNvSpPr/>
+          <p:nvPr/>
+        </p:nvSpPr>
+        <p:spPr>
+          <a:xfrm>
+            <a:off x="9375305" y="4026406"/>
+            <a:ext cx="2562693" cy="559932"/>
+          </a:xfrm>
+          <a:prstGeom prst="roundRect">
+            <a:avLst>
+              <a:gd name="adj" fmla="val 13839"/>
+            </a:avLst>
+          </a:prstGeom>
+          <a:noFill/>
+          <a:ln w="19050">
+            <a:solidFill>
+              <a:srgbClr val="C00000"/>
+            </a:solidFill>
+            <a:prstDash val="sysDash"/>
+          </a:ln>
+        </p:spPr>
+        <p:style>
+          <a:lnRef idx="2">
+            <a:schemeClr val="accent1">
+              <a:shade val="50000"/>
+            </a:schemeClr>
+          </a:lnRef>
+          <a:fillRef idx="1">
+            <a:schemeClr val="accent1"/>
+          </a:fillRef>
+          <a:effectRef idx="0">
+            <a:schemeClr val="accent1"/>
+          </a:effectRef>
+          <a:fontRef idx="minor">
+            <a:schemeClr val="lt1"/>
+          </a:fontRef>
+        </p:style>
+        <p:txBody>
+          <a:bodyPr rtlCol="0" anchor="ctr"/>
+          <a:lstStyle/>
+          <a:p>
+            <a:pPr algn="ctr"/>
+            <a:r>
+              <a:rPr lang="en-US" altLang="zh-CN" sz="1400" b="1" dirty="0">
+                <a:solidFill>
+                  <a:schemeClr val="tx1"/>
+                </a:solidFill>
+                <a:latin typeface="Consolas" panose="020B0609020204030204" pitchFamily="49" charset="0"/>
+                <a:cs typeface="Times New Roman" panose="02020603050405020304" pitchFamily="18" charset="0"/>
+              </a:rPr>
+              <a:t>There are learnable params</a:t>
+            </a:r>
           </a:p>
         </p:txBody>
       </p:sp>

</xml_diff>